<commit_message>
Update spelling and grammar, articals
update Teacher function and also spelling mistake and grammar, articals etc
</commit_message>
<xml_diff>
--- a/Documention/Group project proposal/Presentation.pptx
+++ b/Documention/Group project proposal/Presentation.pptx
@@ -6728,7 +6728,7 @@
         <p:spPr>
           <a:xfrm>
             <a:off x="919065" y="881330"/>
-            <a:ext cx="10353869" cy="5976670"/>
+            <a:ext cx="11272935" cy="5976670"/>
           </a:xfrm>
         </p:spPr>
         <p:txBody>
@@ -6757,7 +6757,85 @@
                   <a:schemeClr val="bg1"/>
                 </a:solidFill>
               </a:rPr>
-              <a:t>Class work: Student can see of his class work.</a:t>
+              <a:t>My Courses: In this function instructor can see which courses and sections he is taking in a particular semester.</a:t>
+            </a:r>
+          </a:p>
+          <a:p>
+            <a:pPr>
+              <a:buFont typeface="Wingdings" panose="05000000000000000000" pitchFamily="2" charset="2"/>
+              <a:buChar char="v"/>
+            </a:pPr>
+            <a:r>
+              <a:rPr lang="en-US" sz="1800" dirty="0">
+                <a:solidFill>
+                  <a:srgbClr val="FFFFFF"/>
+                </a:solidFill>
+                <a:latin typeface="SegoeUI"/>
+              </a:rPr>
+              <a:t>Class time</a:t>
+            </a:r>
+            <a:r>
+              <a:rPr lang="en-US" sz="1800" b="0" i="0" u="none" strike="noStrike" baseline="0" dirty="0">
+                <a:solidFill>
+                  <a:srgbClr val="FFFFFF"/>
+                </a:solidFill>
+                <a:latin typeface="SegoeUI"/>
+              </a:rPr>
+              <a:t>: Here instructor can watch his class timing with weekly days</a:t>
+            </a:r>
+            <a:r>
+              <a:rPr lang="en-US" sz="1800" dirty="0">
+                <a:solidFill>
+                  <a:srgbClr val="FFFFFF"/>
+                </a:solidFill>
+                <a:latin typeface="SegoeUI"/>
+              </a:rPr>
+              <a:t>.</a:t>
+            </a:r>
+            <a:endParaRPr lang="en-US" sz="1800" b="0" i="0" u="none" strike="noStrike" baseline="0" dirty="0">
+              <a:solidFill>
+                <a:srgbClr val="FFFFFF"/>
+              </a:solidFill>
+              <a:latin typeface="SegoeUI"/>
+            </a:endParaRPr>
+          </a:p>
+          <a:p>
+            <a:pPr>
+              <a:buFont typeface="Wingdings" panose="05000000000000000000" pitchFamily="2" charset="2"/>
+              <a:buChar char="v"/>
+            </a:pPr>
+            <a:r>
+              <a:rPr lang="en-US" sz="1800" dirty="0">
+                <a:solidFill>
+                  <a:srgbClr val="FFFFFF"/>
+                </a:solidFill>
+                <a:latin typeface="SegoeUI"/>
+              </a:rPr>
+              <a:t>Manual attendance</a:t>
+            </a:r>
+            <a:r>
+              <a:rPr lang="en-US" sz="1800" b="0" i="0" u="none" strike="noStrike" baseline="0" dirty="0">
+                <a:solidFill>
+                  <a:srgbClr val="FFFFFF"/>
+                </a:solidFill>
+                <a:latin typeface="SegoeUI"/>
+              </a:rPr>
+              <a:t>: This function will allow to take attendance manually and see the total present and absent student number.</a:t>
+            </a:r>
+          </a:p>
+          <a:p>
+            <a:pPr>
+              <a:buFont typeface="Wingdings" panose="05000000000000000000" pitchFamily="2" charset="2"/>
+              <a:buChar char="v"/>
+            </a:pPr>
+            <a:r>
+              <a:rPr lang="en-US" sz="1800" dirty="0">
+                <a:solidFill>
+                  <a:srgbClr val="FFFFFF"/>
+                </a:solidFill>
+                <a:latin typeface="SegoeUI"/>
+              </a:rPr>
+              <a:t>Notification: Here the system will show all kind of notification for the instructor.</a:t>
             </a:r>
           </a:p>
           <a:p>
@@ -6772,37 +6850,7 @@
                 </a:solidFill>
                 <a:latin typeface="SegoeUI"/>
               </a:rPr>
-              <a:t>Notifications: Basically this </a:t>
-            </a:r>
-            <a:r>
-              <a:rPr lang="en-US" sz="1800" dirty="0">
-                <a:solidFill>
-                  <a:srgbClr val="FFFFFF"/>
-                </a:solidFill>
-                <a:latin typeface="SegoeUI"/>
-              </a:rPr>
-              <a:t>function for class work notifications.</a:t>
-            </a:r>
-            <a:endParaRPr lang="en-US" sz="1800" b="0" i="0" u="none" strike="noStrike" baseline="0" dirty="0">
-              <a:solidFill>
-                <a:srgbClr val="FFFFFF"/>
-              </a:solidFill>
-              <a:latin typeface="SegoeUI"/>
-            </a:endParaRPr>
-          </a:p>
-          <a:p>
-            <a:pPr>
-              <a:buFont typeface="Wingdings" panose="05000000000000000000" pitchFamily="2" charset="2"/>
-              <a:buChar char="v"/>
-            </a:pPr>
-            <a:r>
-              <a:rPr lang="en-US" sz="1800" b="0" i="0" u="none" strike="noStrike" baseline="0" dirty="0">
-                <a:solidFill>
-                  <a:srgbClr val="FFFFFF"/>
-                </a:solidFill>
-                <a:latin typeface="SegoeUI"/>
-              </a:rPr>
-              <a:t>Course List: this function use for check course list.</a:t>
+              <a:t>Sent notification: From here instructor can send any kind of notification to the students.</a:t>
             </a:r>
           </a:p>
           <a:p>
@@ -6817,22 +6865,7 @@
                 </a:solidFill>
                 <a:latin typeface="SegoeUI"/>
               </a:rPr>
-              <a:t>Advising: to take course.</a:t>
-            </a:r>
-          </a:p>
-          <a:p>
-            <a:pPr>
-              <a:buFont typeface="Wingdings" panose="05000000000000000000" pitchFamily="2" charset="2"/>
-              <a:buChar char="v"/>
-            </a:pPr>
-            <a:r>
-              <a:rPr lang="en-US" sz="1800" b="0" i="0" u="none" strike="noStrike" baseline="0" dirty="0">
-                <a:solidFill>
-                  <a:srgbClr val="FFFFFF"/>
-                </a:solidFill>
-                <a:latin typeface="SegoeUI"/>
-              </a:rPr>
-              <a:t>Profile: Basic information get from this function.</a:t>
+              <a:t>Upload grade: This function will give instructor upload grade features for all the students in his particular course section.</a:t>
             </a:r>
           </a:p>
           <a:p>
@@ -6847,22 +6880,16 @@
                 </a:solidFill>
                 <a:latin typeface="SegoeUI"/>
               </a:rPr>
-              <a:t>Class time: watch class time and also highlight the class time.</a:t>
+              <a:t>Assign work: Here instructor can assign any kind of </a:t>
             </a:r>
-          </a:p>
-          <a:p>
-            <a:pPr>
-              <a:buFont typeface="Wingdings" panose="05000000000000000000" pitchFamily="2" charset="2"/>
-              <a:buChar char="v"/>
-            </a:pPr>
             <a:r>
-              <a:rPr lang="en-US" sz="1800" b="0" i="0" u="none" strike="noStrike" baseline="0" dirty="0">
+              <a:rPr lang="en-US" sz="1800" dirty="0" err="1">
                 <a:solidFill>
                   <a:srgbClr val="FFFFFF"/>
                 </a:solidFill>
                 <a:latin typeface="SegoeUI"/>
               </a:rPr>
-              <a:t>Add class</a:t>
+              <a:t>cw</a:t>
             </a:r>
             <a:r>
               <a:rPr lang="en-US" sz="1800" dirty="0">
@@ -6871,7 +6898,25 @@
                 </a:solidFill>
                 <a:latin typeface="SegoeUI"/>
               </a:rPr>
-              <a:t>mates: Student can be add of his/ her classmates.</a:t>
+              <a:t> and </a:t>
+            </a:r>
+            <a:r>
+              <a:rPr lang="en-US" sz="1800" dirty="0" err="1">
+                <a:solidFill>
+                  <a:srgbClr val="FFFFFF"/>
+                </a:solidFill>
+                <a:latin typeface="SegoeUI"/>
+              </a:rPr>
+              <a:t>hw</a:t>
+            </a:r>
+            <a:r>
+              <a:rPr lang="en-US" sz="1800" dirty="0">
+                <a:solidFill>
+                  <a:srgbClr val="FFFFFF"/>
+                </a:solidFill>
+                <a:latin typeface="SegoeUI"/>
+              </a:rPr>
+              <a:t> for students.</a:t>
             </a:r>
             <a:endParaRPr lang="en-US" sz="1800" dirty="0">
               <a:solidFill>
@@ -6890,7 +6935,7 @@
                   <a:schemeClr val="bg1"/>
                 </a:solidFill>
               </a:rPr>
-              <a:t>Attendance: count attendance, missing class number etc.</a:t>
+              <a:t>Upload file: Here instructor can upload any kind of reading materials.</a:t>
             </a:r>
           </a:p>
           <a:p>
@@ -6904,7 +6949,7 @@
                   <a:schemeClr val="bg1"/>
                 </a:solidFill>
               </a:rPr>
-              <a:t>Student register: Every student must be registered and have an unique id that is need to access for LMS.</a:t>
+              <a:t>View assignment: In this function instructor can view the submission, late submission or missing assignment with name and id of the student.</a:t>
             </a:r>
           </a:p>
           <a:p>
@@ -6918,7 +6963,35 @@
                   <a:schemeClr val="bg1"/>
                 </a:solidFill>
               </a:rPr>
-              <a:t>Resource: All types of resource like slides, docs and pdf etc. get from function.</a:t>
+              <a:t>My profile: This function will show details about the instructor.</a:t>
+            </a:r>
+          </a:p>
+          <a:p>
+            <a:pPr>
+              <a:buFont typeface="Wingdings" panose="05000000000000000000" pitchFamily="2" charset="2"/>
+              <a:buChar char="v"/>
+            </a:pPr>
+            <a:r>
+              <a:rPr lang="en-US" sz="1800" dirty="0">
+                <a:solidFill>
+                  <a:schemeClr val="bg1"/>
+                </a:solidFill>
+              </a:rPr>
+              <a:t>Offer course time: This feature will allow the instructor to set his preferable time for the course to the institution.</a:t>
+            </a:r>
+          </a:p>
+          <a:p>
+            <a:pPr>
+              <a:buFont typeface="Wingdings" panose="05000000000000000000" pitchFamily="2" charset="2"/>
+              <a:buChar char="v"/>
+            </a:pPr>
+            <a:r>
+              <a:rPr lang="en-US" sz="1800" dirty="0">
+                <a:solidFill>
+                  <a:schemeClr val="bg1"/>
+                </a:solidFill>
+              </a:rPr>
+              <a:t>Dashboard: It’s show the particular day’s classes, recent class work, recent notifications.</a:t>
             </a:r>
           </a:p>
           <a:p>

</xml_diff>